<commit_message>
stats.has-plots: updated summary presentation
</commit_message>
<xml_diff>
--- a/stats.has-plots/summary.pptx
+++ b/stats.has-plots/summary.pptx
@@ -3402,7 +3402,9 @@
         </p:nvSpPr>
         <p:spPr/>
         <p:txBody>
-          <a:bodyPr/>
+          <a:bodyPr>
+            <a:normAutofit fontScale="92500" lnSpcReduction="20000"/>
+          </a:bodyPr>
           <a:lstStyle/>
           <a:p>
             <a:r>
@@ -3413,15 +3415,7 @@
           <a:p>
             <a:r>
               <a:rPr lang="en-US" dirty="0" smtClean="0"/>
-              <a:t>The initial spike is the time to download </a:t>
-            </a:r>
-            <a:r>
-              <a:rPr lang="en-US" dirty="0" err="1" smtClean="0"/>
-              <a:t>ProtoMol</a:t>
-            </a:r>
-            <a:r>
-              <a:rPr lang="en-US" dirty="0" smtClean="0"/>
-              <a:t> to the workers.</a:t>
+              <a:t>The initial spike is the time to download the MD program binary to the workers.</a:t>
             </a:r>
             <a:endParaRPr lang="en-US" dirty="0"/>
           </a:p>
@@ -3509,7 +3503,22 @@
           <a:bodyPr/>
           <a:lstStyle/>
           <a:p>
-            <a:endParaRPr lang="en-US"/>
+            <a:r>
+              <a:rPr lang="en-US" dirty="0" smtClean="0"/>
+              <a:t>Caveat: each call to </a:t>
+            </a:r>
+            <a:r>
+              <a:rPr lang="en-US" dirty="0" smtClean="0">
+                <a:latin typeface="Courier New"/>
+                <a:cs typeface="Courier New"/>
+              </a:rPr>
+              <a:t>resample </a:t>
+            </a:r>
+            <a:r>
+              <a:rPr lang="en-US" dirty="0" smtClean="0"/>
+              <a:t>saves the weights to file.</a:t>
+            </a:r>
+            <a:endParaRPr lang="en-US" dirty="0"/>
           </a:p>
         </p:txBody>
       </p:sp>
@@ -3555,7 +3564,7 @@
           <a:p>
             <a:r>
               <a:rPr lang="en-US" dirty="0" smtClean="0"/>
-              <a:t>Simulations parameters</a:t>
+              <a:t>Setup</a:t>
             </a:r>
             <a:endParaRPr lang="en-US" dirty="0"/>
           </a:p>
@@ -3573,26 +3582,20 @@
         </p:nvSpPr>
         <p:spPr/>
         <p:txBody>
-          <a:bodyPr/>
-          <a:lstStyle/>
-          <a:p>
-            <a:r>
-              <a:rPr lang="en-US" dirty="0" smtClean="0">
-                <a:solidFill>
-                  <a:srgbClr val="FF0000"/>
-                </a:solidFill>
-              </a:rPr>
-              <a:t>5000?</a:t>
-            </a:r>
+          <a:bodyPr>
+            <a:normAutofit lnSpcReduction="10000"/>
+          </a:bodyPr>
+          <a:lstStyle/>
+          <a:p>
             <a:r>
               <a:rPr lang="en-US" dirty="0" smtClean="0"/>
-              <a:t> steps</a:t>
+              <a:t>5000 steps in each simulation</a:t>
             </a:r>
           </a:p>
           <a:p>
             <a:r>
               <a:rPr lang="en-US" dirty="0" smtClean="0"/>
-              <a:t>Binary cached on first execution</a:t>
+              <a:t>Binary cached on workers’ first execution</a:t>
             </a:r>
           </a:p>
           <a:p>
@@ -3604,6 +3607,12 @@
           <a:p>
             <a:r>
               <a:rPr lang="en-US" dirty="0" smtClean="0"/>
+              <a:t>Alanine dipeptide</a:t>
+            </a:r>
+          </a:p>
+          <a:p>
+            <a:r>
+              <a:rPr lang="en-US" dirty="0" smtClean="0"/>
               <a:t>100 cells</a:t>
             </a:r>
           </a:p>
@@ -3611,6 +3620,18 @@
             <a:r>
               <a:rPr lang="en-US" dirty="0" smtClean="0"/>
               <a:t>10 walkers / cell</a:t>
+            </a:r>
+          </a:p>
+          <a:p>
+            <a:r>
+              <a:rPr lang="en-US" dirty="0" smtClean="0"/>
+              <a:t>1000 concurrent tasks</a:t>
+            </a:r>
+          </a:p>
+          <a:p>
+            <a:r>
+              <a:rPr lang="en-US" dirty="0" smtClean="0"/>
+              <a:t>30 iterations</a:t>
             </a:r>
             <a:endParaRPr lang="en-US" dirty="0"/>
           </a:p>
@@ -3664,33 +3685,29 @@
           </a:p>
         </p:txBody>
       </p:sp>
-      <p:sp>
-        <p:nvSpPr>
-          <p:cNvPr id="3" name="Content Placeholder 2"/>
-          <p:cNvSpPr>
-            <a:spLocks noGrp="1"/>
-          </p:cNvSpPr>
+      <p:pic>
+        <p:nvPicPr>
+          <p:cNvPr id="4" name="Content Placeholder 3" descr="awe-schema.png"/>
+          <p:cNvPicPr>
+            <a:picLocks noGrp="1" noChangeAspect="1"/>
+          </p:cNvPicPr>
           <p:nvPr>
             <p:ph idx="1"/>
           </p:nvPr>
-        </p:nvSpPr>
-        <p:spPr/>
-        <p:txBody>
-          <a:bodyPr/>
-          <a:lstStyle/>
-          <a:p>
-            <a:r>
-              <a:rPr lang="en-US" dirty="0" smtClean="0"/>
-              <a:t>To </a:t>
-            </a:r>
-            <a:r>
-              <a:rPr lang="en-US" smtClean="0"/>
-              <a:t>be added</a:t>
-            </a:r>
-            <a:endParaRPr lang="en-US"/>
-          </a:p>
-        </p:txBody>
-      </p:sp>
+        </p:nvPicPr>
+        <p:blipFill>
+          <a:blip r:embed="rId2"/>
+          <a:stretch>
+            <a:fillRect/>
+          </a:stretch>
+        </p:blipFill>
+        <p:spPr>
+          <a:xfrm>
+            <a:off x="457200" y="2035300"/>
+            <a:ext cx="8229600" cy="3655762"/>
+          </a:xfrm>
+        </p:spPr>
+      </p:pic>
     </p:spTree>
   </p:cSld>
   <p:clrMapOvr>
@@ -3871,10 +3888,16 @@
           <a:p>
             <a:pPr algn="ctr"/>
             <a:r>
-              <a:rPr lang="en-US" dirty="0" smtClean="0"/>
+              <a:rPr lang="en-US" dirty="0" smtClean="0">
+                <a:latin typeface="Courier New"/>
+                <a:cs typeface="Courier New"/>
+              </a:rPr>
               <a:t>life time = completion time – submit time</a:t>
             </a:r>
-            <a:endParaRPr lang="en-US" dirty="0"/>
+            <a:endParaRPr lang="en-US" dirty="0">
+              <a:latin typeface="Courier New"/>
+              <a:cs typeface="Courier New"/>
+            </a:endParaRPr>
           </a:p>
         </p:txBody>
       </p:sp>

</xml_diff>